<commit_message>
Final Defense PPTX draft.pptx
</commit_message>
<xml_diff>
--- a/Final Presentation Draft/Final Defense PPTX draft.pptx
+++ b/Final Presentation Draft/Final Defense PPTX draft.pptx
@@ -6,7 +6,7 @@
     <p:sldMasterId id="2147483684" r:id="rId2"/>
   </p:sldMasterIdLst>
   <p:notesMasterIdLst>
-    <p:notesMasterId r:id="rId14"/>
+    <p:notesMasterId r:id="rId15"/>
   </p:notesMasterIdLst>
   <p:sldIdLst>
     <p:sldId id="256" r:id="rId3"/>
@@ -18,38 +18,39 @@
     <p:sldId id="316" r:id="rId9"/>
     <p:sldId id="317" r:id="rId10"/>
     <p:sldId id="319" r:id="rId11"/>
-    <p:sldId id="318" r:id="rId12"/>
-    <p:sldId id="311" r:id="rId13"/>
+    <p:sldId id="320" r:id="rId12"/>
+    <p:sldId id="318" r:id="rId13"/>
+    <p:sldId id="311" r:id="rId14"/>
   </p:sldIdLst>
   <p:sldSz cx="9144000" cy="5143500" type="screen16x9"/>
   <p:notesSz cx="6858000" cy="9144000"/>
   <p:embeddedFontLst>
     <p:embeddedFont>
       <p:font typeface="Mulish" panose="020B0604020202020204" charset="0"/>
-      <p:regular r:id="rId15"/>
-      <p:bold r:id="rId16"/>
-      <p:italic r:id="rId17"/>
-      <p:boldItalic r:id="rId18"/>
+      <p:regular r:id="rId16"/>
+      <p:bold r:id="rId17"/>
+      <p:italic r:id="rId18"/>
+      <p:boldItalic r:id="rId19"/>
     </p:embeddedFont>
     <p:embeddedFont>
       <p:font typeface="Poppins" panose="020B0604020202020204" charset="0"/>
-      <p:regular r:id="rId19"/>
-      <p:bold r:id="rId20"/>
-      <p:italic r:id="rId21"/>
-      <p:boldItalic r:id="rId22"/>
+      <p:regular r:id="rId20"/>
+      <p:bold r:id="rId21"/>
+      <p:italic r:id="rId22"/>
+      <p:boldItalic r:id="rId23"/>
     </p:embeddedFont>
     <p:embeddedFont>
       <p:font typeface="Proxima Nova" panose="020B0604020202020204" charset="0"/>
-      <p:regular r:id="rId23"/>
-      <p:bold r:id="rId24"/>
-      <p:italic r:id="rId25"/>
-      <p:boldItalic r:id="rId26"/>
+      <p:regular r:id="rId24"/>
+      <p:bold r:id="rId25"/>
+      <p:italic r:id="rId26"/>
+      <p:boldItalic r:id="rId27"/>
     </p:embeddedFont>
     <p:embeddedFont>
       <p:font typeface="Proxima Nova Semibold" panose="020B0604020202020204" charset="0"/>
-      <p:regular r:id="rId27"/>
-      <p:bold r:id="rId28"/>
-      <p:boldItalic r:id="rId29"/>
+      <p:regular r:id="rId28"/>
+      <p:bold r:id="rId29"/>
+      <p:boldItalic r:id="rId30"/>
     </p:embeddedFont>
   </p:embeddedFontLst>
   <p:defaultTextStyle>
@@ -943,6 +944,115 @@
     </p:spTree>
     <p:extLst>
       <p:ext uri="{BB962C8B-B14F-4D97-AF65-F5344CB8AC3E}">
+        <p14:creationId xmlns:p14="http://schemas.microsoft.com/office/powerpoint/2010/main" val="3546786380"/>
+      </p:ext>
+    </p:extLst>
+  </p:cSld>
+  <p:clrMapOvr>
+    <a:masterClrMapping/>
+  </p:clrMapOvr>
+</p:notes>
+</file>
+
+<file path=ppt/notesSlides/notesSlide11.xml><?xml version="1.0" encoding="utf-8"?>
+<p:notes xmlns:a="http://schemas.openxmlformats.org/drawingml/2006/main" xmlns:r="http://schemas.openxmlformats.org/officeDocument/2006/relationships" xmlns:p="http://schemas.openxmlformats.org/presentationml/2006/main" showMasterSp="0" showMasterPhAnim="0">
+  <p:cSld>
+    <p:spTree>
+      <p:nvGrpSpPr>
+        <p:cNvPr id="1" name="Shape 845"/>
+        <p:cNvGrpSpPr/>
+        <p:nvPr/>
+      </p:nvGrpSpPr>
+      <p:grpSpPr>
+        <a:xfrm>
+          <a:off x="0" y="0"/>
+          <a:ext cx="0" cy="0"/>
+          <a:chOff x="0" y="0"/>
+          <a:chExt cx="0" cy="0"/>
+        </a:xfrm>
+      </p:grpSpPr>
+      <p:sp>
+        <p:nvSpPr>
+          <p:cNvPr id="846" name="Google Shape;846;g1e13d400223_0_270:notes"/>
+          <p:cNvSpPr>
+            <a:spLocks noGrp="1" noRot="1" noChangeAspect="1"/>
+          </p:cNvSpPr>
+          <p:nvPr>
+            <p:ph type="sldImg" idx="2"/>
+          </p:nvPr>
+        </p:nvSpPr>
+        <p:spPr>
+          <a:xfrm>
+            <a:off x="381000" y="685800"/>
+            <a:ext cx="6096000" cy="3429000"/>
+          </a:xfrm>
+          <a:custGeom>
+            <a:avLst/>
+            <a:gdLst/>
+            <a:ahLst/>
+            <a:cxnLst/>
+            <a:rect l="l" t="t" r="r" b="b"/>
+            <a:pathLst>
+              <a:path w="120000" h="120000" extrusionOk="0">
+                <a:moveTo>
+                  <a:pt x="0" y="0"/>
+                </a:moveTo>
+                <a:lnTo>
+                  <a:pt x="120000" y="0"/>
+                </a:lnTo>
+                <a:lnTo>
+                  <a:pt x="120000" y="120000"/>
+                </a:lnTo>
+                <a:lnTo>
+                  <a:pt x="0" y="120000"/>
+                </a:lnTo>
+                <a:close/>
+              </a:path>
+            </a:pathLst>
+          </a:custGeom>
+        </p:spPr>
+      </p:sp>
+      <p:sp>
+        <p:nvSpPr>
+          <p:cNvPr id="847" name="Google Shape;847;g1e13d400223_0_270:notes"/>
+          <p:cNvSpPr txBox="1">
+            <a:spLocks noGrp="1"/>
+          </p:cNvSpPr>
+          <p:nvPr>
+            <p:ph type="body" idx="1"/>
+          </p:nvPr>
+        </p:nvSpPr>
+        <p:spPr>
+          <a:xfrm>
+            <a:off x="685800" y="4343400"/>
+            <a:ext cx="5486400" cy="4114800"/>
+          </a:xfrm>
+          <a:prstGeom prst="rect">
+            <a:avLst/>
+          </a:prstGeom>
+        </p:spPr>
+        <p:txBody>
+          <a:bodyPr spcFirstLastPara="1" wrap="square" lIns="91425" tIns="91425" rIns="91425" bIns="91425" anchor="t" anchorCtr="0">
+            <a:noAutofit/>
+          </a:bodyPr>
+          <a:lstStyle/>
+          <a:p>
+            <a:pPr marL="0" lvl="0" indent="0" algn="l" rtl="0">
+              <a:spcBef>
+                <a:spcPts val="0"/>
+              </a:spcBef>
+              <a:spcAft>
+                <a:spcPts val="0"/>
+              </a:spcAft>
+              <a:buNone/>
+            </a:pPr>
+            <a:endParaRPr/>
+          </a:p>
+        </p:txBody>
+      </p:sp>
+    </p:spTree>
+    <p:extLst>
+      <p:ext uri="{BB962C8B-B14F-4D97-AF65-F5344CB8AC3E}">
         <p14:creationId xmlns:p14="http://schemas.microsoft.com/office/powerpoint/2010/main" val="3857978186"/>
       </p:ext>
     </p:extLst>
@@ -953,7 +1063,7 @@
 </p:notes>
 </file>
 
-<file path=ppt/notesSlides/notesSlide11.xml><?xml version="1.0" encoding="utf-8"?>
+<file path=ppt/notesSlides/notesSlide12.xml><?xml version="1.0" encoding="utf-8"?>
 <p:notes xmlns:a="http://schemas.openxmlformats.org/drawingml/2006/main" xmlns:r="http://schemas.openxmlformats.org/officeDocument/2006/relationships" xmlns:p="http://schemas.openxmlformats.org/presentationml/2006/main" showMasterSp="0" showMasterPhAnim="0">
   <p:cSld>
     <p:spTree>
@@ -13597,6 +13707,151 @@
               <a:buNone/>
             </a:pPr>
             <a:r>
+              <a:rPr lang="en-US" sz="4000" dirty="0"/>
+              <a:t>Future </a:t>
+            </a:r>
+            <a:r>
+              <a:rPr lang="en-US" sz="4000" dirty="0" err="1"/>
+              <a:t>Enhancemets</a:t>
+            </a:r>
+            <a:r>
+              <a:rPr lang="en-US" sz="4000" dirty="0"/>
+              <a:t>:</a:t>
+            </a:r>
+            <a:endParaRPr sz="4000" dirty="0"/>
+          </a:p>
+        </p:txBody>
+      </p:sp>
+      <p:sp>
+        <p:nvSpPr>
+          <p:cNvPr id="850" name="Google Shape;850;p41"/>
+          <p:cNvSpPr txBox="1">
+            <a:spLocks noGrp="1"/>
+          </p:cNvSpPr>
+          <p:nvPr>
+            <p:ph type="subTitle" idx="1"/>
+          </p:nvPr>
+        </p:nvSpPr>
+        <p:spPr>
+          <a:xfrm>
+            <a:off x="2842817" y="1394889"/>
+            <a:ext cx="5679954" cy="2548460"/>
+          </a:xfrm>
+          <a:prstGeom prst="rect">
+            <a:avLst/>
+          </a:prstGeom>
+        </p:spPr>
+        <p:txBody>
+          <a:bodyPr spcFirstLastPara="1" wrap="square" lIns="91425" tIns="91425" rIns="91425" bIns="91425" anchor="t" anchorCtr="0">
+            <a:noAutofit/>
+          </a:bodyPr>
+          <a:lstStyle/>
+          <a:p>
+            <a:pPr algn="just">
+              <a:buFont typeface="Wingdings" panose="05000000000000000000" pitchFamily="2" charset="2"/>
+              <a:buChar char="ü"/>
+            </a:pPr>
+            <a:r>
+              <a:rPr lang="en-US" dirty="0"/>
+              <a:t>..</a:t>
+            </a:r>
+          </a:p>
+        </p:txBody>
+      </p:sp>
+      <p:pic>
+        <p:nvPicPr>
+          <p:cNvPr id="851" name="Google Shape;851;p41"/>
+          <p:cNvPicPr preferRelativeResize="0">
+            <a:picLocks noGrp="1"/>
+          </p:cNvPicPr>
+          <p:nvPr>
+            <p:ph type="pic" idx="2"/>
+          </p:nvPr>
+        </p:nvPicPr>
+        <p:blipFill rotWithShape="1">
+          <a:blip r:embed="rId3">
+            <a:alphaModFix/>
+          </a:blip>
+          <a:srcRect r="34115"/>
+          <a:stretch/>
+        </p:blipFill>
+        <p:spPr>
+          <a:xfrm>
+            <a:off x="254119" y="604322"/>
+            <a:ext cx="2324100" cy="3527400"/>
+          </a:xfrm>
+          <a:prstGeom prst="roundRect">
+            <a:avLst>
+              <a:gd name="adj" fmla="val 50000"/>
+            </a:avLst>
+          </a:prstGeom>
+        </p:spPr>
+      </p:pic>
+    </p:spTree>
+    <p:extLst>
+      <p:ext uri="{BB962C8B-B14F-4D97-AF65-F5344CB8AC3E}">
+        <p14:creationId xmlns:p14="http://schemas.microsoft.com/office/powerpoint/2010/main" val="167934901"/>
+      </p:ext>
+    </p:extLst>
+  </p:cSld>
+  <p:clrMapOvr>
+    <a:masterClrMapping/>
+  </p:clrMapOvr>
+</p:sld>
+</file>
+
+<file path=ppt/slides/slide11.xml><?xml version="1.0" encoding="utf-8"?>
+<p:sld xmlns:a="http://schemas.openxmlformats.org/drawingml/2006/main" xmlns:r="http://schemas.openxmlformats.org/officeDocument/2006/relationships" xmlns:p="http://schemas.openxmlformats.org/presentationml/2006/main">
+  <p:cSld>
+    <p:spTree>
+      <p:nvGrpSpPr>
+        <p:cNvPr id="1" name="Shape 848"/>
+        <p:cNvGrpSpPr/>
+        <p:nvPr/>
+      </p:nvGrpSpPr>
+      <p:grpSpPr>
+        <a:xfrm>
+          <a:off x="0" y="0"/>
+          <a:ext cx="0" cy="0"/>
+          <a:chOff x="0" y="0"/>
+          <a:chExt cx="0" cy="0"/>
+        </a:xfrm>
+      </p:grpSpPr>
+      <p:sp>
+        <p:nvSpPr>
+          <p:cNvPr id="849" name="Google Shape;849;p41"/>
+          <p:cNvSpPr txBox="1">
+            <a:spLocks noGrp="1"/>
+          </p:cNvSpPr>
+          <p:nvPr>
+            <p:ph type="title"/>
+          </p:nvPr>
+        </p:nvSpPr>
+        <p:spPr>
+          <a:xfrm>
+            <a:off x="2842817" y="460923"/>
+            <a:ext cx="5529657" cy="858300"/>
+          </a:xfrm>
+          <a:prstGeom prst="rect">
+            <a:avLst/>
+          </a:prstGeom>
+        </p:spPr>
+        <p:txBody>
+          <a:bodyPr spcFirstLastPara="1" wrap="square" lIns="91425" tIns="91425" rIns="91425" bIns="91425" anchor="b" anchorCtr="0">
+            <a:noAutofit/>
+          </a:bodyPr>
+          <a:lstStyle/>
+          <a:p>
+            <a:pPr marL="0" lvl="0" indent="0" algn="l" rtl="0">
+              <a:spcBef>
+                <a:spcPts val="0"/>
+              </a:spcBef>
+              <a:spcAft>
+                <a:spcPts val="0"/>
+              </a:spcAft>
+              <a:buNone/>
+            </a:pPr>
+            <a:r>
               <a:rPr lang="en-US" sz="4400" dirty="0"/>
               <a:t>Conclusion</a:t>
             </a:r>
@@ -13737,7 +13992,7 @@
 </p:sld>
 </file>
 
-<file path=ppt/slides/slide11.xml><?xml version="1.0" encoding="utf-8"?>
+<file path=ppt/slides/slide12.xml><?xml version="1.0" encoding="utf-8"?>
 <p:sld xmlns:a="http://schemas.openxmlformats.org/drawingml/2006/main" xmlns:r="http://schemas.openxmlformats.org/officeDocument/2006/relationships" xmlns:p="http://schemas.openxmlformats.org/presentationml/2006/main">
   <p:cSld>
     <p:bg>
@@ -14957,8 +15212,8 @@
         </p:blipFill>
         <p:spPr>
           <a:xfrm>
-            <a:off x="150019" y="1240641"/>
-            <a:ext cx="3786187" cy="2825208"/>
+            <a:off x="367553" y="1291553"/>
+            <a:ext cx="3559714" cy="2560394"/>
           </a:xfrm>
           <a:prstGeom prst="rect">
             <a:avLst/>
@@ -15065,7 +15320,7 @@
         <p:spPr>
           <a:xfrm>
             <a:off x="1807369" y="800308"/>
-            <a:ext cx="5529262" cy="4022248"/>
+            <a:ext cx="5803666" cy="4103386"/>
           </a:xfrm>
           <a:prstGeom prst="rect">
             <a:avLst/>

</xml_diff>